<commit_message>
prezentacj 00 i 01 wiedza
</commit_message>
<xml_diff>
--- a/6. Docs/Bartosz_Reszka_Piwowarski_Prezentacja.pptx
+++ b/6. Docs/Bartosz_Reszka_Piwowarski_Prezentacja.pptx
@@ -331,7 +331,7 @@
           <a:p>
             <a:fld id="{2593D5D9-7C3B-40F9-9AB8-DDFAEE6819C1}" type="datetimeFigureOut">
               <a:rPr lang="pl-PL" smtClean="0"/>
-              <a:t>03.06.2024</a:t>
+              <a:t>04.06.2024</a:t>
             </a:fld>
             <a:endParaRPr lang="pl-PL"/>
           </a:p>
@@ -40960,6 +40960,180 @@
               <a:t>out.csv: Plik wyjściowy (wynikowy) z danymi.</a:t>
             </a:r>
             <a:endParaRPr lang="de-DE" sz="1200" dirty="0"/>
+          </a:p>
+        </p:txBody>
+      </p:sp>
+      <p:sp>
+        <p:nvSpPr>
+          <p:cNvPr id="3" name="Textfeld 2">
+            <a:extLst>
+              <a:ext uri="{FF2B5EF4-FFF2-40B4-BE49-F238E27FC236}">
+                <a16:creationId xmlns:a16="http://schemas.microsoft.com/office/drawing/2014/main" id="{46C1FE66-0D9C-6D95-88B7-128D26416E54}"/>
+              </a:ext>
+            </a:extLst>
+          </p:cNvPr>
+          <p:cNvSpPr txBox="1"/>
+          <p:nvPr/>
+        </p:nvSpPr>
+        <p:spPr>
+          <a:xfrm>
+            <a:off x="6095999" y="3475168"/>
+            <a:ext cx="5524387" cy="2646878"/>
+          </a:xfrm>
+          <a:prstGeom prst="rect">
+            <a:avLst/>
+          </a:prstGeom>
+          <a:noFill/>
+        </p:spPr>
+        <p:txBody>
+          <a:bodyPr wrap="square">
+            <a:spAutoFit/>
+          </a:bodyPr>
+          <a:lstStyle/>
+          <a:p>
+            <a:r>
+              <a:rPr lang="pl-PL" sz="1200" b="1" dirty="0">
+                <a:solidFill>
+                  <a:srgbClr val="0D0D0D"/>
+                </a:solidFill>
+                <a:highlight>
+                  <a:srgbClr val="FFFFFF"/>
+                </a:highlight>
+                <a:latin typeface="+mj-lt"/>
+              </a:rPr>
+              <a:t>Najważniejszye biblioteki uzyte w projekcie:</a:t>
+            </a:r>
+            <a:endParaRPr lang="de-DE" sz="1200" b="1" dirty="0">
+              <a:solidFill>
+                <a:srgbClr val="0D0D0D"/>
+              </a:solidFill>
+              <a:highlight>
+                <a:srgbClr val="FFFFFF"/>
+              </a:highlight>
+              <a:latin typeface="+mj-lt"/>
+            </a:endParaRPr>
+          </a:p>
+          <a:p>
+            <a:endParaRPr lang="pl-PL" sz="1000" b="1" dirty="0">
+              <a:solidFill>
+                <a:srgbClr val="0D0D0D"/>
+              </a:solidFill>
+              <a:highlight>
+                <a:srgbClr val="FFFFFF"/>
+              </a:highlight>
+              <a:latin typeface="+mj-lt"/>
+            </a:endParaRPr>
+          </a:p>
+          <a:p>
+            <a:pPr marL="171450" indent="-171450" algn="just">
+              <a:buFont typeface="Arial" panose="020B0604020202020204" pitchFamily="34" charset="0"/>
+              <a:buChar char="•"/>
+            </a:pPr>
+            <a:r>
+              <a:rPr lang="pl-PL" sz="1200" b="1" dirty="0"/>
+              <a:t>pandas</a:t>
+            </a:r>
+            <a:r>
+              <a:rPr lang="pl-PL" sz="1200" dirty="0"/>
+              <a:t>:</a:t>
+            </a:r>
+            <a:r>
+              <a:rPr lang="de-DE" sz="1200" dirty="0"/>
+              <a:t> </a:t>
+            </a:r>
+            <a:r>
+              <a:rPr lang="pl-PL" sz="1200" dirty="0"/>
+              <a:t>Biblioteka do analizy danych, umożliwiająca manipulację i analizę dużych zbiorów danych poprzez struktury danych takie jak DataFrame.</a:t>
+            </a:r>
+          </a:p>
+          <a:p>
+            <a:pPr marL="171450" indent="-171450" algn="just">
+              <a:buFont typeface="Arial" panose="020B0604020202020204" pitchFamily="34" charset="0"/>
+              <a:buChar char="•"/>
+            </a:pPr>
+            <a:r>
+              <a:rPr lang="pl-PL" sz="1200" dirty="0"/>
+              <a:t> </a:t>
+            </a:r>
+            <a:r>
+              <a:rPr lang="pl-PL" sz="1200" b="1" dirty="0"/>
+              <a:t>numpy:</a:t>
+            </a:r>
+            <a:r>
+              <a:rPr lang="de-DE" sz="1200" b="1" dirty="0"/>
+              <a:t> </a:t>
+            </a:r>
+            <a:r>
+              <a:rPr lang="pl-PL" sz="1200" dirty="0"/>
+              <a:t>Podstawowa biblioteka dla obliczeń numerycznych w Pythonie, oferująca wsparcie dla wielowymiarowych tablic oraz różnorodnych funkcji matematycznych.</a:t>
+            </a:r>
+          </a:p>
+          <a:p>
+            <a:pPr marL="171450" indent="-171450" algn="just">
+              <a:buFont typeface="Arial" panose="020B0604020202020204" pitchFamily="34" charset="0"/>
+              <a:buChar char="•"/>
+            </a:pPr>
+            <a:r>
+              <a:rPr lang="pl-PL" sz="1200" b="1" dirty="0"/>
+              <a:t>scikit-learn: </a:t>
+            </a:r>
+            <a:r>
+              <a:rPr lang="pl-PL" sz="1200" dirty="0"/>
+              <a:t>Biblioteka do uczenia maszynowego, zawierająca narzędzia do modelowania danych, w tym klasyfikacji, regresji i klasteryzacji.</a:t>
+            </a:r>
+          </a:p>
+          <a:p>
+            <a:pPr marL="171450" indent="-171450" algn="just">
+              <a:buFont typeface="Arial" panose="020B0604020202020204" pitchFamily="34" charset="0"/>
+              <a:buChar char="•"/>
+            </a:pPr>
+            <a:r>
+              <a:rPr lang="pl-PL" sz="1200" b="1" dirty="0"/>
+              <a:t>matplotlib</a:t>
+            </a:r>
+            <a:r>
+              <a:rPr lang="de-DE" sz="1200" b="1" dirty="0"/>
+              <a:t>/</a:t>
+            </a:r>
+            <a:r>
+              <a:rPr lang="pl-PL" sz="1200" b="1" dirty="0"/>
+              <a:t> seaborn:</a:t>
+            </a:r>
+            <a:r>
+              <a:rPr lang="de-DE" sz="1200" dirty="0"/>
+              <a:t> </a:t>
+            </a:r>
+            <a:r>
+              <a:rPr lang="pl-PL" sz="1200" dirty="0"/>
+              <a:t>Biblioteka do tworzenia wykresów i wizualizacji danych, pozwalająca na generowanie szerokiej gamy statycznych, animowanych i interaktywnych wizualizacji.</a:t>
+            </a:r>
+          </a:p>
+          <a:p>
+            <a:pPr marL="171450" indent="-171450" algn="just">
+              <a:buFont typeface="Arial" panose="020B0604020202020204" pitchFamily="34" charset="0"/>
+              <a:buChar char="•"/>
+            </a:pPr>
+            <a:r>
+              <a:rPr lang="pl-PL" sz="1200" b="1" dirty="0"/>
+              <a:t>dash:</a:t>
+            </a:r>
+            <a:r>
+              <a:rPr lang="de-DE" sz="1200" dirty="0"/>
+              <a:t> </a:t>
+            </a:r>
+            <a:r>
+              <a:rPr lang="pl-PL" sz="1200" dirty="0"/>
+              <a:t>Framework oparty na Flask i Plotly, specjalnie zaprojektowany do tworzenia interaktywnych aplikacji webowych i dashboardów.</a:t>
+            </a:r>
+            <a:endParaRPr lang="de-DE" sz="1200" dirty="0">
+              <a:solidFill>
+                <a:srgbClr val="0D0D0D"/>
+              </a:solidFill>
+              <a:highlight>
+                <a:srgbClr val="FFFFFF"/>
+              </a:highlight>
+              <a:latin typeface="+mj-lt"/>
+            </a:endParaRPr>
           </a:p>
         </p:txBody>
       </p:sp>
@@ -51156,6 +51330,15 @@
 </file>
 
 <file path=customXml/item2.xml><?xml version="1.0" encoding="utf-8"?>
+<?mso-contentType ?>
+<FormTemplates xmlns="http://schemas.microsoft.com/sharepoint/v3/contenttype/forms">
+  <Display>DocumentLibraryForm</Display>
+  <Edit>DocumentLibraryForm</Edit>
+  <New>DocumentLibraryForm</New>
+</FormTemplates>
+</file>
+
+<file path=customXml/item3.xml><?xml version="1.0" encoding="utf-8"?>
 <p:properties xmlns:p="http://schemas.microsoft.com/office/2006/metadata/properties" xmlns:xsi="http://www.w3.org/2001/XMLSchema-instance" xmlns:pc="http://schemas.microsoft.com/office/infopath/2007/PartnerControls">
   <documentManagement>
     <TaxCatchAll xmlns="f1dfd687-ce92-41e8-800b-11e03cd3205f" xsi:nil="true"/>
@@ -51164,15 +51347,6 @@
     </lcf76f155ced4ddcb4097134ff3c332f>
   </documentManagement>
 </p:properties>
-</file>
-
-<file path=customXml/item3.xml><?xml version="1.0" encoding="utf-8"?>
-<?mso-contentType ?>
-<FormTemplates xmlns="http://schemas.microsoft.com/sharepoint/v3/contenttype/forms">
-  <Display>DocumentLibraryForm</Display>
-  <Edit>DocumentLibraryForm</Edit>
-  <New>DocumentLibraryForm</New>
-</FormTemplates>
 </file>
 
 <file path=customXml/itemProps1.xml><?xml version="1.0" encoding="utf-8"?>
@@ -51195,6 +51369,14 @@
 </file>
 
 <file path=customXml/itemProps2.xml><?xml version="1.0" encoding="utf-8"?>
+<ds:datastoreItem xmlns:ds="http://schemas.openxmlformats.org/officeDocument/2006/customXml" ds:itemID="{E3C0B90A-C52C-44A3-8B28-1EFDD964602C}">
+  <ds:schemaRefs>
+    <ds:schemaRef ds:uri="http://schemas.microsoft.com/sharepoint/v3/contenttype/forms"/>
+  </ds:schemaRefs>
+</ds:datastoreItem>
+</file>
+
+<file path=customXml/itemProps3.xml><?xml version="1.0" encoding="utf-8"?>
 <ds:datastoreItem xmlns:ds="http://schemas.openxmlformats.org/officeDocument/2006/customXml" ds:itemID="{1947D6F3-2A49-4F89-9265-CD52A17ECC67}">
   <ds:schemaRefs>
     <ds:schemaRef ds:uri="http://purl.org/dc/dcmitype/"/>
@@ -51212,12 +51394,4 @@
     <ds:schemaRef ds:uri="cc32ea10-24d7-4ab8-908a-92053f695cd3"/>
   </ds:schemaRefs>
 </ds:datastoreItem>
-</file>
-
-<file path=customXml/itemProps3.xml><?xml version="1.0" encoding="utf-8"?>
-<ds:datastoreItem xmlns:ds="http://schemas.openxmlformats.org/officeDocument/2006/customXml" ds:itemID="{E3C0B90A-C52C-44A3-8B28-1EFDD964602C}">
-  <ds:schemaRefs>
-    <ds:schemaRef ds:uri="http://schemas.microsoft.com/sharepoint/v3/contenttype/forms"/>
-  </ds:schemaRefs>
-</ds:datastoreItem>
 </file>
</xml_diff>